<commit_message>
Improve graphics; add double pendulum description
</commit_message>
<xml_diff>
--- a/source-code/sympy/img/pendulums.pptx
+++ b/source-code/sympy/img/pendulums.pptx
@@ -6,6 +6,7 @@
   </p:sldMasterIdLst>
   <p:sldIdLst>
     <p:sldId id="256" r:id="rId2"/>
+    <p:sldId id="258" r:id="rId3"/>
   </p:sldIdLst>
   <p:sldSz cx="12192000" cy="6858000"/>
   <p:notesSz cx="6858000" cy="9144000"/>
@@ -104,7 +105,207 @@
       </a:defRPr>
     </a:lvl9pPr>
   </p:defaultTextStyle>
+  <p:extLst>
+    <p:ext uri="{EFAFB233-063F-42B5-8137-9DF3F51BA10A}">
+      <p15:sldGuideLst xmlns:p15="http://schemas.microsoft.com/office/powerpoint/2012/main"/>
+    </p:ext>
+  </p:extLst>
 </p:presentation>
+</file>
+
+<file path=ppt/revisionInfo.xml><?xml version="1.0" encoding="utf-8"?>
+<p1510:revInfo xmlns:a="http://schemas.openxmlformats.org/drawingml/2006/main" xmlns:r="http://schemas.openxmlformats.org/officeDocument/2006/relationships" xmlns:p1510="http://schemas.microsoft.com/office/powerpoint/2015/10/main">
+  <p1510:revLst>
+    <p1510:client id="{C5B78163-32E9-4263-83EB-AC3175CC59E8}" v="14" dt="2022-12-08T14:07:13.519"/>
+  </p1510:revLst>
+</p1510:revInfo>
+</file>
+
+<file path=ppt/changesInfos/changesInfo1.xml><?xml version="1.0" encoding="utf-8"?>
+<pc:chgInfo xmlns:a="http://schemas.openxmlformats.org/drawingml/2006/main" xmlns:r="http://schemas.openxmlformats.org/officeDocument/2006/relationships" xmlns:ac="http://schemas.microsoft.com/office/drawing/2013/main/command" xmlns:pc="http://schemas.microsoft.com/office/powerpoint/2013/main/command">
+  <pc:docChgLst>
+    <pc:chgData name="Geert Jan Bex" userId="b602d378c858ceb4" providerId="LiveId" clId="{C5B78163-32E9-4263-83EB-AC3175CC59E8}"/>
+    <pc:docChg chg="custSel addSld delSld modSld">
+      <pc:chgData name="Geert Jan Bex" userId="b602d378c858ceb4" providerId="LiveId" clId="{C5B78163-32E9-4263-83EB-AC3175CC59E8}" dt="2022-12-08T14:08:15.945" v="114" actId="1076"/>
+      <pc:docMkLst>
+        <pc:docMk/>
+      </pc:docMkLst>
+      <pc:sldChg chg="addSp modSp mod">
+        <pc:chgData name="Geert Jan Bex" userId="b602d378c858ceb4" providerId="LiveId" clId="{C5B78163-32E9-4263-83EB-AC3175CC59E8}" dt="2022-12-08T14:05:31.496" v="83" actId="20577"/>
+        <pc:sldMkLst>
+          <pc:docMk/>
+          <pc:sldMk cId="4218050570" sldId="256"/>
+        </pc:sldMkLst>
+        <pc:spChg chg="add mod">
+          <ac:chgData name="Geert Jan Bex" userId="b602d378c858ceb4" providerId="LiveId" clId="{C5B78163-32E9-4263-83EB-AC3175CC59E8}" dt="2022-12-08T13:53:06.533" v="14" actId="1035"/>
+          <ac:spMkLst>
+            <pc:docMk/>
+            <pc:sldMk cId="4218050570" sldId="256"/>
+            <ac:spMk id="2" creationId="{69E08350-E4E7-F2F9-2820-E9B88711207E}"/>
+          </ac:spMkLst>
+        </pc:spChg>
+        <pc:spChg chg="add mod">
+          <ac:chgData name="Geert Jan Bex" userId="b602d378c858ceb4" providerId="LiveId" clId="{C5B78163-32E9-4263-83EB-AC3175CC59E8}" dt="2022-12-08T14:05:31.496" v="83" actId="20577"/>
+          <ac:spMkLst>
+            <pc:docMk/>
+            <pc:sldMk cId="4218050570" sldId="256"/>
+            <ac:spMk id="3" creationId="{2D4F9790-5232-5C7C-6AF0-CD8464029078}"/>
+          </ac:spMkLst>
+        </pc:spChg>
+      </pc:sldChg>
+      <pc:sldChg chg="add del">
+        <pc:chgData name="Geert Jan Bex" userId="b602d378c858ceb4" providerId="LiveId" clId="{C5B78163-32E9-4263-83EB-AC3175CC59E8}" dt="2022-12-08T13:53:16.040" v="16" actId="47"/>
+        <pc:sldMkLst>
+          <pc:docMk/>
+          <pc:sldMk cId="3659419325" sldId="257"/>
+        </pc:sldMkLst>
+      </pc:sldChg>
+      <pc:sldChg chg="addSp delSp modSp add mod">
+        <pc:chgData name="Geert Jan Bex" userId="b602d378c858ceb4" providerId="LiveId" clId="{C5B78163-32E9-4263-83EB-AC3175CC59E8}" dt="2022-12-08T14:08:15.945" v="114" actId="1076"/>
+        <pc:sldMkLst>
+          <pc:docMk/>
+          <pc:sldMk cId="3571560792" sldId="258"/>
+        </pc:sldMkLst>
+        <pc:spChg chg="mod">
+          <ac:chgData name="Geert Jan Bex" userId="b602d378c858ceb4" providerId="LiveId" clId="{C5B78163-32E9-4263-83EB-AC3175CC59E8}" dt="2022-12-08T14:00:08.060" v="28" actId="947"/>
+          <ac:spMkLst>
+            <pc:docMk/>
+            <pc:sldMk cId="3571560792" sldId="258"/>
+            <ac:spMk id="2" creationId="{69E08350-E4E7-F2F9-2820-E9B88711207E}"/>
+          </ac:spMkLst>
+        </pc:spChg>
+        <pc:spChg chg="add mod">
+          <ac:chgData name="Geert Jan Bex" userId="b602d378c858ceb4" providerId="LiveId" clId="{C5B78163-32E9-4263-83EB-AC3175CC59E8}" dt="2022-12-08T14:00:39.915" v="36" actId="6549"/>
+          <ac:spMkLst>
+            <pc:docMk/>
+            <pc:sldMk cId="3571560792" sldId="258"/>
+            <ac:spMk id="3" creationId="{A88566EE-7FE7-62CA-2940-9BE46EE06FD9}"/>
+          </ac:spMkLst>
+        </pc:spChg>
+        <pc:spChg chg="mod">
+          <ac:chgData name="Geert Jan Bex" userId="b602d378c858ceb4" providerId="LiveId" clId="{C5B78163-32E9-4263-83EB-AC3175CC59E8}" dt="2022-12-08T14:00:51.916" v="37"/>
+          <ac:spMkLst>
+            <pc:docMk/>
+            <pc:sldMk cId="3571560792" sldId="258"/>
+            <ac:spMk id="6" creationId="{6D5424F5-91BE-B9D6-A816-88B9BA192BB9}"/>
+          </ac:spMkLst>
+        </pc:spChg>
+        <pc:spChg chg="mod">
+          <ac:chgData name="Geert Jan Bex" userId="b602d378c858ceb4" providerId="LiveId" clId="{C5B78163-32E9-4263-83EB-AC3175CC59E8}" dt="2022-12-08T13:58:49.630" v="19" actId="947"/>
+          <ac:spMkLst>
+            <pc:docMk/>
+            <pc:sldMk cId="3571560792" sldId="258"/>
+            <ac:spMk id="18" creationId="{EE1D0F6F-9D81-7FD9-CBA6-D65ADC555D60}"/>
+          </ac:spMkLst>
+        </pc:spChg>
+        <pc:spChg chg="add mod">
+          <ac:chgData name="Geert Jan Bex" userId="b602d378c858ceb4" providerId="LiveId" clId="{C5B78163-32E9-4263-83EB-AC3175CC59E8}" dt="2022-12-08T14:08:03.380" v="113" actId="1035"/>
+          <ac:spMkLst>
+            <pc:docMk/>
+            <pc:sldMk cId="3571560792" sldId="258"/>
+            <ac:spMk id="22" creationId="{E59AB0A4-5BD2-A8BE-56A9-605966402F0C}"/>
+          </ac:spMkLst>
+        </pc:spChg>
+        <pc:spChg chg="mod">
+          <ac:chgData name="Geert Jan Bex" userId="b602d378c858ceb4" providerId="LiveId" clId="{C5B78163-32E9-4263-83EB-AC3175CC59E8}" dt="2022-12-08T13:59:43.913" v="25" actId="947"/>
+          <ac:spMkLst>
+            <pc:docMk/>
+            <pc:sldMk cId="3571560792" sldId="258"/>
+            <ac:spMk id="23" creationId="{F0FA4738-3AF2-8852-EC53-E1D5B108F022}"/>
+          </ac:spMkLst>
+        </pc:spChg>
+        <pc:spChg chg="del">
+          <ac:chgData name="Geert Jan Bex" userId="b602d378c858ceb4" providerId="LiveId" clId="{C5B78163-32E9-4263-83EB-AC3175CC59E8}" dt="2022-12-08T14:00:12.796" v="29" actId="478"/>
+          <ac:spMkLst>
+            <pc:docMk/>
+            <pc:sldMk cId="3571560792" sldId="258"/>
+            <ac:spMk id="24" creationId="{B1361793-6DE0-91BA-0BB2-15233C61C708}"/>
+          </ac:spMkLst>
+        </pc:spChg>
+        <pc:spChg chg="add mod">
+          <ac:chgData name="Geert Jan Bex" userId="b602d378c858ceb4" providerId="LiveId" clId="{C5B78163-32E9-4263-83EB-AC3175CC59E8}" dt="2022-12-08T14:03:52.564" v="70" actId="20577"/>
+          <ac:spMkLst>
+            <pc:docMk/>
+            <pc:sldMk cId="3571560792" sldId="258"/>
+            <ac:spMk id="26" creationId="{0F24F96B-0DB8-A265-EDB6-E471152ED869}"/>
+          </ac:spMkLst>
+        </pc:spChg>
+        <pc:spChg chg="add mod">
+          <ac:chgData name="Geert Jan Bex" userId="b602d378c858ceb4" providerId="LiveId" clId="{C5B78163-32E9-4263-83EB-AC3175CC59E8}" dt="2022-12-08T14:08:15.945" v="114" actId="1076"/>
+          <ac:spMkLst>
+            <pc:docMk/>
+            <pc:sldMk cId="3571560792" sldId="258"/>
+            <ac:spMk id="27" creationId="{3FCA1A7A-9CE5-04D8-F9DF-7A339103AA4E}"/>
+          </ac:spMkLst>
+        </pc:spChg>
+        <pc:spChg chg="add mod">
+          <ac:chgData name="Geert Jan Bex" userId="b602d378c858ceb4" providerId="LiveId" clId="{C5B78163-32E9-4263-83EB-AC3175CC59E8}" dt="2022-12-08T14:05:07.357" v="80" actId="20577"/>
+          <ac:spMkLst>
+            <pc:docMk/>
+            <pc:sldMk cId="3571560792" sldId="258"/>
+            <ac:spMk id="28" creationId="{AC0C3065-05D1-9B20-882F-EE1A94D0F643}"/>
+          </ac:spMkLst>
+        </pc:spChg>
+        <pc:spChg chg="add mod">
+          <ac:chgData name="Geert Jan Bex" userId="b602d378c858ceb4" providerId="LiveId" clId="{C5B78163-32E9-4263-83EB-AC3175CC59E8}" dt="2022-12-08T14:06:04.206" v="87" actId="20577"/>
+          <ac:spMkLst>
+            <pc:docMk/>
+            <pc:sldMk cId="3571560792" sldId="258"/>
+            <ac:spMk id="29" creationId="{CCCC369D-EB01-C7FB-7480-09A54B41A13E}"/>
+          </ac:spMkLst>
+        </pc:spChg>
+        <pc:spChg chg="add mod">
+          <ac:chgData name="Geert Jan Bex" userId="b602d378c858ceb4" providerId="LiveId" clId="{C5B78163-32E9-4263-83EB-AC3175CC59E8}" dt="2022-12-08T14:06:20.246" v="91" actId="20577"/>
+          <ac:spMkLst>
+            <pc:docMk/>
+            <pc:sldMk cId="3571560792" sldId="258"/>
+            <ac:spMk id="30" creationId="{4EA27157-54F2-0515-12FB-0D81A1B6F258}"/>
+          </ac:spMkLst>
+        </pc:spChg>
+        <pc:spChg chg="add mod">
+          <ac:chgData name="Geert Jan Bex" userId="b602d378c858ceb4" providerId="LiveId" clId="{C5B78163-32E9-4263-83EB-AC3175CC59E8}" dt="2022-12-08T14:07:52.425" v="97" actId="14100"/>
+          <ac:spMkLst>
+            <pc:docMk/>
+            <pc:sldMk cId="3571560792" sldId="258"/>
+            <ac:spMk id="31" creationId="{9BE57C37-B31E-DF4E-6654-425158CB5283}"/>
+          </ac:spMkLst>
+        </pc:spChg>
+        <pc:grpChg chg="add mod">
+          <ac:chgData name="Geert Jan Bex" userId="b602d378c858ceb4" providerId="LiveId" clId="{C5B78163-32E9-4263-83EB-AC3175CC59E8}" dt="2022-12-08T14:01:51.791" v="41" actId="1076"/>
+          <ac:grpSpMkLst>
+            <pc:docMk/>
+            <pc:sldMk cId="3571560792" sldId="258"/>
+            <ac:grpSpMk id="4" creationId="{BF303828-0BA0-00E1-6053-E94B69745E7D}"/>
+          </ac:grpSpMkLst>
+        </pc:grpChg>
+        <pc:cxnChg chg="mod">
+          <ac:chgData name="Geert Jan Bex" userId="b602d378c858ceb4" providerId="LiveId" clId="{C5B78163-32E9-4263-83EB-AC3175CC59E8}" dt="2022-12-08T14:01:59.935" v="42" actId="14100"/>
+          <ac:cxnSpMkLst>
+            <pc:docMk/>
+            <pc:sldMk cId="3571560792" sldId="258"/>
+            <ac:cxnSpMk id="9" creationId="{C831D71E-1400-2FDF-4060-3A5ABF2D9ED9}"/>
+          </ac:cxnSpMkLst>
+        </pc:cxnChg>
+        <pc:cxnChg chg="mod">
+          <ac:chgData name="Geert Jan Bex" userId="b602d378c858ceb4" providerId="LiveId" clId="{C5B78163-32E9-4263-83EB-AC3175CC59E8}" dt="2022-12-08T14:01:43.164" v="40" actId="14100"/>
+          <ac:cxnSpMkLst>
+            <pc:docMk/>
+            <pc:sldMk cId="3571560792" sldId="258"/>
+            <ac:cxnSpMk id="21" creationId="{EA67A937-ABB3-F6BC-C532-310350636B54}"/>
+          </ac:cxnSpMkLst>
+        </pc:cxnChg>
+        <pc:cxnChg chg="add mod">
+          <ac:chgData name="Geert Jan Bex" userId="b602d378c858ceb4" providerId="LiveId" clId="{C5B78163-32E9-4263-83EB-AC3175CC59E8}" dt="2022-12-08T14:03:17.211" v="64" actId="1037"/>
+          <ac:cxnSpMkLst>
+            <pc:docMk/>
+            <pc:sldMk cId="3571560792" sldId="258"/>
+            <ac:cxnSpMk id="25" creationId="{21D6B151-5EFB-CFB8-00F1-B8E7C52A21DF}"/>
+          </ac:cxnSpMkLst>
+        </pc:cxnChg>
+      </pc:sldChg>
+    </pc:docChg>
+  </pc:docChgLst>
+</pc:chgInfo>
 </file>
 
 <file path=ppt/slideLayouts/slideLayout1.xml><?xml version="1.0" encoding="utf-8"?>
@@ -3889,10 +4090,1221 @@
           </a:p>
         </p:txBody>
       </p:sp>
+      <p:sp>
+        <p:nvSpPr>
+          <p:cNvPr id="2" name="TextBox 1">
+            <a:extLst>
+              <a:ext uri="{FF2B5EF4-FFF2-40B4-BE49-F238E27FC236}">
+                <a16:creationId xmlns:a16="http://schemas.microsoft.com/office/drawing/2014/main" id="{69E08350-E4E7-F2F9-2820-E9B88711207E}"/>
+              </a:ext>
+            </a:extLst>
+          </p:cNvPr>
+          <p:cNvSpPr txBox="1"/>
+          <p:nvPr/>
+        </p:nvSpPr>
+        <p:spPr>
+          <a:xfrm>
+            <a:off x="7165910" y="2304658"/>
+            <a:ext cx="255198" cy="461665"/>
+          </a:xfrm>
+          <a:prstGeom prst="rect">
+            <a:avLst/>
+          </a:prstGeom>
+          <a:noFill/>
+        </p:spPr>
+        <p:txBody>
+          <a:bodyPr wrap="none" rtlCol="0">
+            <a:spAutoFit/>
+          </a:bodyPr>
+          <a:lstStyle/>
+          <a:p>
+            <a:r>
+              <a:rPr lang="en-US" sz="2400" i="1" dirty="0"/>
+              <a:t>l</a:t>
+            </a:r>
+            <a:endParaRPr lang="LID4096" sz="2400" i="1" dirty="0"/>
+          </a:p>
+        </p:txBody>
+      </p:sp>
+      <p:sp>
+        <p:nvSpPr>
+          <p:cNvPr id="3" name="TextBox 2">
+            <a:extLst>
+              <a:ext uri="{FF2B5EF4-FFF2-40B4-BE49-F238E27FC236}">
+                <a16:creationId xmlns:a16="http://schemas.microsoft.com/office/drawing/2014/main" id="{2D4F9790-5232-5C7C-6AF0-CD8464029078}"/>
+              </a:ext>
+            </a:extLst>
+          </p:cNvPr>
+          <p:cNvSpPr txBox="1"/>
+          <p:nvPr/>
+        </p:nvSpPr>
+        <p:spPr>
+          <a:xfrm>
+            <a:off x="8946552" y="3532644"/>
+            <a:ext cx="428322" cy="461665"/>
+          </a:xfrm>
+          <a:prstGeom prst="rect">
+            <a:avLst/>
+          </a:prstGeom>
+          <a:noFill/>
+        </p:spPr>
+        <p:txBody>
+          <a:bodyPr wrap="none" rtlCol="0">
+            <a:spAutoFit/>
+          </a:bodyPr>
+          <a:lstStyle/>
+          <a:p>
+            <a:r>
+              <a:rPr lang="en-US" sz="2400" i="1" dirty="0"/>
+              <a:t>m</a:t>
+            </a:r>
+            <a:endParaRPr lang="LID4096" sz="2400" i="1" dirty="0"/>
+          </a:p>
+        </p:txBody>
+      </p:sp>
     </p:spTree>
     <p:extLst>
       <p:ext uri="{BB962C8B-B14F-4D97-AF65-F5344CB8AC3E}">
         <p14:creationId xmlns:p14="http://schemas.microsoft.com/office/powerpoint/2010/main" val="4218050570"/>
+      </p:ext>
+    </p:extLst>
+  </p:cSld>
+  <p:clrMapOvr>
+    <a:masterClrMapping/>
+  </p:clrMapOvr>
+</p:sld>
+</file>
+
+<file path=ppt/slides/slide2.xml><?xml version="1.0" encoding="utf-8"?>
+<p:sld xmlns:a="http://schemas.openxmlformats.org/drawingml/2006/main" xmlns:r="http://schemas.openxmlformats.org/officeDocument/2006/relationships" xmlns:p="http://schemas.openxmlformats.org/presentationml/2006/main">
+  <p:cSld>
+    <p:spTree>
+      <p:nvGrpSpPr>
+        <p:cNvPr id="1" name=""/>
+        <p:cNvGrpSpPr/>
+        <p:nvPr/>
+      </p:nvGrpSpPr>
+      <p:grpSpPr>
+        <a:xfrm>
+          <a:off x="0" y="0"/>
+          <a:ext cx="0" cy="0"/>
+          <a:chOff x="0" y="0"/>
+          <a:chExt cx="0" cy="0"/>
+        </a:xfrm>
+      </p:grpSpPr>
+      <p:sp>
+        <p:nvSpPr>
+          <p:cNvPr id="5" name="Oval 4">
+            <a:extLst>
+              <a:ext uri="{FF2B5EF4-FFF2-40B4-BE49-F238E27FC236}">
+                <a16:creationId xmlns:a16="http://schemas.microsoft.com/office/drawing/2014/main" id="{25EE1495-0FAB-9D96-B40D-652E7844842A}"/>
+              </a:ext>
+            </a:extLst>
+          </p:cNvPr>
+          <p:cNvSpPr/>
+          <p:nvPr/>
+        </p:nvSpPr>
+        <p:spPr>
+          <a:xfrm>
+            <a:off x="5332286" y="1674690"/>
+            <a:ext cx="113015" cy="113015"/>
+          </a:xfrm>
+          <a:prstGeom prst="ellipse">
+            <a:avLst/>
+          </a:prstGeom>
+        </p:spPr>
+        <p:style>
+          <a:lnRef idx="2">
+            <a:schemeClr val="accent1">
+              <a:shade val="50000"/>
+            </a:schemeClr>
+          </a:lnRef>
+          <a:fillRef idx="1">
+            <a:schemeClr val="accent1"/>
+          </a:fillRef>
+          <a:effectRef idx="0">
+            <a:schemeClr val="accent1"/>
+          </a:effectRef>
+          <a:fontRef idx="minor">
+            <a:schemeClr val="lt1"/>
+          </a:fontRef>
+        </p:style>
+        <p:txBody>
+          <a:bodyPr rtlCol="0" anchor="ctr"/>
+          <a:lstStyle/>
+          <a:p>
+            <a:pPr algn="ctr"/>
+            <a:endParaRPr lang="en-US"/>
+          </a:p>
+        </p:txBody>
+      </p:sp>
+      <p:cxnSp>
+        <p:nvCxnSpPr>
+          <p:cNvPr id="7" name="Straight Connector 6">
+            <a:extLst>
+              <a:ext uri="{FF2B5EF4-FFF2-40B4-BE49-F238E27FC236}">
+                <a16:creationId xmlns:a16="http://schemas.microsoft.com/office/drawing/2014/main" id="{A5F6DC31-DE16-857F-1700-051536453406}"/>
+              </a:ext>
+            </a:extLst>
+          </p:cNvPr>
+          <p:cNvCxnSpPr/>
+          <p:nvPr/>
+        </p:nvCxnSpPr>
+        <p:spPr>
+          <a:xfrm>
+            <a:off x="1890445" y="1735686"/>
+            <a:ext cx="7880279" cy="0"/>
+          </a:xfrm>
+          <a:prstGeom prst="line">
+            <a:avLst/>
+          </a:prstGeom>
+          <a:ln w="28575">
+            <a:tailEnd type="stealth" w="lg" len="lg"/>
+          </a:ln>
+        </p:spPr>
+        <p:style>
+          <a:lnRef idx="1">
+            <a:schemeClr val="accent1"/>
+          </a:lnRef>
+          <a:fillRef idx="0">
+            <a:schemeClr val="accent1"/>
+          </a:fillRef>
+          <a:effectRef idx="0">
+            <a:schemeClr val="accent1"/>
+          </a:effectRef>
+          <a:fontRef idx="minor">
+            <a:schemeClr val="tx1"/>
+          </a:fontRef>
+        </p:style>
+      </p:cxnSp>
+      <p:cxnSp>
+        <p:nvCxnSpPr>
+          <p:cNvPr id="8" name="Straight Connector 7">
+            <a:extLst>
+              <a:ext uri="{FF2B5EF4-FFF2-40B4-BE49-F238E27FC236}">
+                <a16:creationId xmlns:a16="http://schemas.microsoft.com/office/drawing/2014/main" id="{B5E6B85A-9AF7-C51C-D685-012CD590649F}"/>
+              </a:ext>
+            </a:extLst>
+          </p:cNvPr>
+          <p:cNvCxnSpPr>
+            <a:cxnSpLocks/>
+          </p:cNvCxnSpPr>
+          <p:nvPr/>
+        </p:nvCxnSpPr>
+        <p:spPr>
+          <a:xfrm flipV="1">
+            <a:off x="5386218" y="442762"/>
+            <a:ext cx="0" cy="5385464"/>
+          </a:xfrm>
+          <a:prstGeom prst="line">
+            <a:avLst/>
+          </a:prstGeom>
+          <a:ln w="28575">
+            <a:tailEnd type="stealth" w="lg" len="lg"/>
+          </a:ln>
+        </p:spPr>
+        <p:style>
+          <a:lnRef idx="1">
+            <a:schemeClr val="accent1"/>
+          </a:lnRef>
+          <a:fillRef idx="0">
+            <a:schemeClr val="accent1"/>
+          </a:fillRef>
+          <a:effectRef idx="0">
+            <a:schemeClr val="accent1"/>
+          </a:effectRef>
+          <a:fontRef idx="minor">
+            <a:schemeClr val="tx1"/>
+          </a:fontRef>
+        </p:style>
+      </p:cxnSp>
+      <p:sp>
+        <p:nvSpPr>
+          <p:cNvPr id="10" name="TextBox 9">
+            <a:extLst>
+              <a:ext uri="{FF2B5EF4-FFF2-40B4-BE49-F238E27FC236}">
+                <a16:creationId xmlns:a16="http://schemas.microsoft.com/office/drawing/2014/main" id="{E1A15FF3-6AE0-07BE-A0C9-6E0C5182E21D}"/>
+              </a:ext>
+            </a:extLst>
+          </p:cNvPr>
+          <p:cNvSpPr txBox="1"/>
+          <p:nvPr/>
+        </p:nvSpPr>
+        <p:spPr>
+          <a:xfrm>
+            <a:off x="9355755" y="1299412"/>
+            <a:ext cx="317716" cy="461665"/>
+          </a:xfrm>
+          <a:prstGeom prst="rect">
+            <a:avLst/>
+          </a:prstGeom>
+          <a:noFill/>
+        </p:spPr>
+        <p:txBody>
+          <a:bodyPr wrap="none" rtlCol="0">
+            <a:spAutoFit/>
+          </a:bodyPr>
+          <a:lstStyle/>
+          <a:p>
+            <a:r>
+              <a:rPr lang="en-US" sz="2400" i="1" dirty="0"/>
+              <a:t>x</a:t>
+            </a:r>
+          </a:p>
+        </p:txBody>
+      </p:sp>
+      <p:sp>
+        <p:nvSpPr>
+          <p:cNvPr id="11" name="TextBox 10">
+            <a:extLst>
+              <a:ext uri="{FF2B5EF4-FFF2-40B4-BE49-F238E27FC236}">
+                <a16:creationId xmlns:a16="http://schemas.microsoft.com/office/drawing/2014/main" id="{312E1C56-B7CE-6A26-75E7-B1C7C7A902AD}"/>
+              </a:ext>
+            </a:extLst>
+          </p:cNvPr>
+          <p:cNvSpPr txBox="1"/>
+          <p:nvPr/>
+        </p:nvSpPr>
+        <p:spPr>
+          <a:xfrm>
+            <a:off x="4984268" y="412279"/>
+            <a:ext cx="322524" cy="461665"/>
+          </a:xfrm>
+          <a:prstGeom prst="rect">
+            <a:avLst/>
+          </a:prstGeom>
+          <a:noFill/>
+        </p:spPr>
+        <p:txBody>
+          <a:bodyPr wrap="none" rtlCol="0">
+            <a:spAutoFit/>
+          </a:bodyPr>
+          <a:lstStyle/>
+          <a:p>
+            <a:r>
+              <a:rPr lang="en-US" sz="2400" i="1" dirty="0"/>
+              <a:t>y</a:t>
+            </a:r>
+            <a:endParaRPr lang="en-US" i="1" dirty="0"/>
+          </a:p>
+        </p:txBody>
+      </p:sp>
+      <p:grpSp>
+        <p:nvGrpSpPr>
+          <p:cNvPr id="16" name="Group 15">
+            <a:extLst>
+              <a:ext uri="{FF2B5EF4-FFF2-40B4-BE49-F238E27FC236}">
+                <a16:creationId xmlns:a16="http://schemas.microsoft.com/office/drawing/2014/main" id="{58CAB6E1-5818-1F84-89CF-BEA04A74279F}"/>
+              </a:ext>
+            </a:extLst>
+          </p:cNvPr>
+          <p:cNvGrpSpPr/>
+          <p:nvPr/>
+        </p:nvGrpSpPr>
+        <p:grpSpPr>
+          <a:xfrm>
+            <a:off x="5377926" y="1740823"/>
+            <a:ext cx="3467691" cy="2022654"/>
+            <a:chOff x="5445301" y="1731198"/>
+            <a:chExt cx="3467691" cy="2022654"/>
+          </a:xfrm>
+        </p:grpSpPr>
+        <p:sp>
+          <p:nvSpPr>
+            <p:cNvPr id="12" name="Oval 11">
+              <a:extLst>
+                <a:ext uri="{FF2B5EF4-FFF2-40B4-BE49-F238E27FC236}">
+                  <a16:creationId xmlns:a16="http://schemas.microsoft.com/office/drawing/2014/main" id="{6302D800-8A73-6A29-7CED-DB2C8A7363EF}"/>
+                </a:ext>
+              </a:extLst>
+            </p:cNvPr>
+            <p:cNvSpPr/>
+            <p:nvPr/>
+          </p:nvSpPr>
+          <p:spPr>
+            <a:xfrm>
+              <a:off x="8518357" y="3359217"/>
+              <a:ext cx="394635" cy="394635"/>
+            </a:xfrm>
+            <a:prstGeom prst="ellipse">
+              <a:avLst/>
+            </a:prstGeom>
+          </p:spPr>
+          <p:style>
+            <a:lnRef idx="2">
+              <a:schemeClr val="accent1">
+                <a:shade val="50000"/>
+              </a:schemeClr>
+            </a:lnRef>
+            <a:fillRef idx="1">
+              <a:schemeClr val="accent1"/>
+            </a:fillRef>
+            <a:effectRef idx="0">
+              <a:schemeClr val="accent1"/>
+            </a:effectRef>
+            <a:fontRef idx="minor">
+              <a:schemeClr val="lt1"/>
+            </a:fontRef>
+          </p:style>
+          <p:txBody>
+            <a:bodyPr rtlCol="0" anchor="ctr"/>
+            <a:lstStyle/>
+            <a:p>
+              <a:pPr algn="ctr"/>
+              <a:endParaRPr lang="en-US"/>
+            </a:p>
+          </p:txBody>
+        </p:sp>
+        <p:cxnSp>
+          <p:nvCxnSpPr>
+            <p:cNvPr id="14" name="Straight Connector 13">
+              <a:extLst>
+                <a:ext uri="{FF2B5EF4-FFF2-40B4-BE49-F238E27FC236}">
+                  <a16:creationId xmlns:a16="http://schemas.microsoft.com/office/drawing/2014/main" id="{DAF0D0DB-82F7-CA7B-1794-1BE6819322CE}"/>
+                </a:ext>
+              </a:extLst>
+            </p:cNvPr>
+            <p:cNvCxnSpPr>
+              <a:cxnSpLocks/>
+              <a:stCxn id="5" idx="6"/>
+            </p:cNvCxnSpPr>
+            <p:nvPr/>
+          </p:nvCxnSpPr>
+          <p:spPr>
+            <a:xfrm>
+              <a:off x="5445301" y="1731198"/>
+              <a:ext cx="3265562" cy="1830149"/>
+            </a:xfrm>
+            <a:prstGeom prst="line">
+              <a:avLst/>
+            </a:prstGeom>
+          </p:spPr>
+          <p:style>
+            <a:lnRef idx="1">
+              <a:schemeClr val="accent1"/>
+            </a:lnRef>
+            <a:fillRef idx="0">
+              <a:schemeClr val="accent1"/>
+            </a:fillRef>
+            <a:effectRef idx="0">
+              <a:schemeClr val="accent1"/>
+            </a:effectRef>
+            <a:fontRef idx="minor">
+              <a:schemeClr val="tx1"/>
+            </a:fontRef>
+          </p:style>
+        </p:cxnSp>
+      </p:grpSp>
+      <p:sp>
+        <p:nvSpPr>
+          <p:cNvPr id="17" name="Arc 16">
+            <a:extLst>
+              <a:ext uri="{FF2B5EF4-FFF2-40B4-BE49-F238E27FC236}">
+                <a16:creationId xmlns:a16="http://schemas.microsoft.com/office/drawing/2014/main" id="{A6128E4B-33B4-E7EE-4A2B-EFB6E648D99B}"/>
+              </a:ext>
+            </a:extLst>
+          </p:cNvPr>
+          <p:cNvSpPr/>
+          <p:nvPr/>
+        </p:nvSpPr>
+        <p:spPr>
+          <a:xfrm flipV="1">
+            <a:off x="4897643" y="1872468"/>
+            <a:ext cx="993998" cy="345834"/>
+          </a:xfrm>
+          <a:prstGeom prst="arc">
+            <a:avLst/>
+          </a:prstGeom>
+          <a:ln w="22225">
+            <a:prstDash val="sysDot"/>
+          </a:ln>
+        </p:spPr>
+        <p:style>
+          <a:lnRef idx="1">
+            <a:schemeClr val="accent1"/>
+          </a:lnRef>
+          <a:fillRef idx="0">
+            <a:schemeClr val="accent1"/>
+          </a:fillRef>
+          <a:effectRef idx="0">
+            <a:schemeClr val="accent1"/>
+          </a:effectRef>
+          <a:fontRef idx="minor">
+            <a:schemeClr val="tx1"/>
+          </a:fontRef>
+        </p:style>
+        <p:txBody>
+          <a:bodyPr rtlCol="0" anchor="ctr"/>
+          <a:lstStyle/>
+          <a:p>
+            <a:pPr algn="ctr"/>
+            <a:endParaRPr lang="en-US"/>
+          </a:p>
+        </p:txBody>
+      </p:sp>
+      <p:sp>
+        <p:nvSpPr>
+          <p:cNvPr id="18" name="TextBox 17">
+            <a:extLst>
+              <a:ext uri="{FF2B5EF4-FFF2-40B4-BE49-F238E27FC236}">
+                <a16:creationId xmlns:a16="http://schemas.microsoft.com/office/drawing/2014/main" id="{EE1D0F6F-9D81-7FD9-CBA6-D65ADC555D60}"/>
+              </a:ext>
+            </a:extLst>
+          </p:cNvPr>
+          <p:cNvSpPr txBox="1"/>
+          <p:nvPr/>
+        </p:nvSpPr>
+        <p:spPr>
+          <a:xfrm>
+            <a:off x="5534527" y="2146438"/>
+            <a:ext cx="449162" cy="461665"/>
+          </a:xfrm>
+          <a:prstGeom prst="rect">
+            <a:avLst/>
+          </a:prstGeom>
+          <a:noFill/>
+        </p:spPr>
+        <p:txBody>
+          <a:bodyPr wrap="none" rtlCol="0">
+            <a:spAutoFit/>
+          </a:bodyPr>
+          <a:lstStyle/>
+          <a:p>
+            <a:r>
+              <a:rPr lang="en-US" sz="2400" i="1" dirty="0">
+                <a:sym typeface="Symbol" panose="05050102010706020507" pitchFamily="18" charset="2"/>
+              </a:rPr>
+              <a:t></a:t>
+            </a:r>
+            <a:r>
+              <a:rPr lang="en-US" sz="2400" baseline="-25000" dirty="0">
+                <a:sym typeface="Symbol" panose="05050102010706020507" pitchFamily="18" charset="2"/>
+              </a:rPr>
+              <a:t>1</a:t>
+            </a:r>
+            <a:endParaRPr lang="en-US" sz="2400" baseline="-25000" dirty="0"/>
+          </a:p>
+        </p:txBody>
+      </p:sp>
+      <p:cxnSp>
+        <p:nvCxnSpPr>
+          <p:cNvPr id="20" name="Straight Connector 19">
+            <a:extLst>
+              <a:ext uri="{FF2B5EF4-FFF2-40B4-BE49-F238E27FC236}">
+                <a16:creationId xmlns:a16="http://schemas.microsoft.com/office/drawing/2014/main" id="{060CA585-8C71-DE3B-B809-3C02E8963CB5}"/>
+              </a:ext>
+            </a:extLst>
+          </p:cNvPr>
+          <p:cNvCxnSpPr/>
+          <p:nvPr/>
+        </p:nvCxnSpPr>
+        <p:spPr>
+          <a:xfrm flipH="1">
+            <a:off x="5377926" y="3566159"/>
+            <a:ext cx="3265562" cy="0"/>
+          </a:xfrm>
+          <a:prstGeom prst="line">
+            <a:avLst/>
+          </a:prstGeom>
+          <a:ln w="12700">
+            <a:prstDash val="sysDot"/>
+          </a:ln>
+        </p:spPr>
+        <p:style>
+          <a:lnRef idx="1">
+            <a:schemeClr val="accent1"/>
+          </a:lnRef>
+          <a:fillRef idx="0">
+            <a:schemeClr val="accent1"/>
+          </a:fillRef>
+          <a:effectRef idx="0">
+            <a:schemeClr val="accent1"/>
+          </a:effectRef>
+          <a:fontRef idx="minor">
+            <a:schemeClr val="tx1"/>
+          </a:fontRef>
+        </p:style>
+      </p:cxnSp>
+      <p:cxnSp>
+        <p:nvCxnSpPr>
+          <p:cNvPr id="21" name="Straight Connector 20">
+            <a:extLst>
+              <a:ext uri="{FF2B5EF4-FFF2-40B4-BE49-F238E27FC236}">
+                <a16:creationId xmlns:a16="http://schemas.microsoft.com/office/drawing/2014/main" id="{EA67A937-ABB3-F6BC-C532-310350636B54}"/>
+              </a:ext>
+            </a:extLst>
+          </p:cNvPr>
+          <p:cNvCxnSpPr>
+            <a:cxnSpLocks/>
+          </p:cNvCxnSpPr>
+          <p:nvPr/>
+        </p:nvCxnSpPr>
+        <p:spPr>
+          <a:xfrm flipV="1">
+            <a:off x="8643488" y="1731197"/>
+            <a:ext cx="0" cy="3839179"/>
+          </a:xfrm>
+          <a:prstGeom prst="line">
+            <a:avLst/>
+          </a:prstGeom>
+          <a:ln w="12700">
+            <a:prstDash val="sysDot"/>
+          </a:ln>
+        </p:spPr>
+        <p:style>
+          <a:lnRef idx="1">
+            <a:schemeClr val="accent1"/>
+          </a:lnRef>
+          <a:fillRef idx="0">
+            <a:schemeClr val="accent1"/>
+          </a:fillRef>
+          <a:effectRef idx="0">
+            <a:schemeClr val="accent1"/>
+          </a:effectRef>
+          <a:fontRef idx="minor">
+            <a:schemeClr val="tx1"/>
+          </a:fontRef>
+        </p:style>
+      </p:cxnSp>
+      <p:sp>
+        <p:nvSpPr>
+          <p:cNvPr id="23" name="TextBox 22">
+            <a:extLst>
+              <a:ext uri="{FF2B5EF4-FFF2-40B4-BE49-F238E27FC236}">
+                <a16:creationId xmlns:a16="http://schemas.microsoft.com/office/drawing/2014/main" id="{F0FA4738-3AF2-8852-EC53-E1D5B108F022}"/>
+              </a:ext>
+            </a:extLst>
+          </p:cNvPr>
+          <p:cNvSpPr txBox="1"/>
+          <p:nvPr/>
+        </p:nvSpPr>
+        <p:spPr>
+          <a:xfrm>
+            <a:off x="6514339" y="3599847"/>
+            <a:ext cx="1085554" cy="461665"/>
+          </a:xfrm>
+          <a:prstGeom prst="rect">
+            <a:avLst/>
+          </a:prstGeom>
+          <a:noFill/>
+        </p:spPr>
+        <p:txBody>
+          <a:bodyPr wrap="none" rtlCol="0">
+            <a:spAutoFit/>
+          </a:bodyPr>
+          <a:lstStyle/>
+          <a:p>
+            <a:r>
+              <a:rPr lang="en-US" sz="2400" i="1" dirty="0"/>
+              <a:t>l</a:t>
+            </a:r>
+            <a:r>
+              <a:rPr lang="en-US" sz="2400" baseline="-25000" dirty="0"/>
+              <a:t>1</a:t>
+            </a:r>
+            <a:r>
+              <a:rPr lang="en-US" sz="2400" dirty="0"/>
+              <a:t> sin</a:t>
+            </a:r>
+            <a:r>
+              <a:rPr lang="en-US" sz="1400" dirty="0"/>
+              <a:t> </a:t>
+            </a:r>
+            <a:r>
+              <a:rPr lang="en-US" sz="2400" i="1" dirty="0">
+                <a:sym typeface="Symbol" panose="05050102010706020507" pitchFamily="18" charset="2"/>
+              </a:rPr>
+              <a:t></a:t>
+            </a:r>
+            <a:r>
+              <a:rPr lang="en-US" sz="2400" baseline="-25000" dirty="0">
+                <a:sym typeface="Symbol" panose="05050102010706020507" pitchFamily="18" charset="2"/>
+              </a:rPr>
+              <a:t>1</a:t>
+            </a:r>
+            <a:endParaRPr lang="en-US" sz="2400" baseline="-25000" dirty="0"/>
+          </a:p>
+        </p:txBody>
+      </p:sp>
+      <p:sp>
+        <p:nvSpPr>
+          <p:cNvPr id="2" name="TextBox 1">
+            <a:extLst>
+              <a:ext uri="{FF2B5EF4-FFF2-40B4-BE49-F238E27FC236}">
+                <a16:creationId xmlns:a16="http://schemas.microsoft.com/office/drawing/2014/main" id="{69E08350-E4E7-F2F9-2820-E9B88711207E}"/>
+              </a:ext>
+            </a:extLst>
+          </p:cNvPr>
+          <p:cNvSpPr txBox="1"/>
+          <p:nvPr/>
+        </p:nvSpPr>
+        <p:spPr>
+          <a:xfrm>
+            <a:off x="7165910" y="2304658"/>
+            <a:ext cx="359394" cy="461665"/>
+          </a:xfrm>
+          <a:prstGeom prst="rect">
+            <a:avLst/>
+          </a:prstGeom>
+          <a:noFill/>
+        </p:spPr>
+        <p:txBody>
+          <a:bodyPr wrap="none" rtlCol="0">
+            <a:spAutoFit/>
+          </a:bodyPr>
+          <a:lstStyle/>
+          <a:p>
+            <a:r>
+              <a:rPr lang="en-US" sz="2400" i="1" dirty="0"/>
+              <a:t>l</a:t>
+            </a:r>
+            <a:r>
+              <a:rPr lang="en-US" sz="2400" baseline="-25000" dirty="0"/>
+              <a:t>1</a:t>
+            </a:r>
+            <a:endParaRPr lang="LID4096" sz="2400" baseline="-25000" dirty="0"/>
+          </a:p>
+        </p:txBody>
+      </p:sp>
+      <p:sp>
+        <p:nvSpPr>
+          <p:cNvPr id="3" name="TextBox 2">
+            <a:extLst>
+              <a:ext uri="{FF2B5EF4-FFF2-40B4-BE49-F238E27FC236}">
+                <a16:creationId xmlns:a16="http://schemas.microsoft.com/office/drawing/2014/main" id="{A88566EE-7FE7-62CA-2940-9BE46EE06FD9}"/>
+              </a:ext>
+            </a:extLst>
+          </p:cNvPr>
+          <p:cNvSpPr txBox="1"/>
+          <p:nvPr/>
+        </p:nvSpPr>
+        <p:spPr>
+          <a:xfrm>
+            <a:off x="8812978" y="2218302"/>
+            <a:ext cx="1236877" cy="461665"/>
+          </a:xfrm>
+          <a:prstGeom prst="rect">
+            <a:avLst/>
+          </a:prstGeom>
+          <a:noFill/>
+        </p:spPr>
+        <p:txBody>
+          <a:bodyPr wrap="none" rtlCol="0">
+            <a:spAutoFit/>
+          </a:bodyPr>
+          <a:lstStyle/>
+          <a:p>
+            <a:r>
+              <a:rPr lang="en-US" sz="2400" i="1" dirty="0"/>
+              <a:t>-l</a:t>
+            </a:r>
+            <a:r>
+              <a:rPr lang="en-US" sz="2400" baseline="-25000" dirty="0"/>
+              <a:t>1</a:t>
+            </a:r>
+            <a:r>
+              <a:rPr lang="en-US" sz="2400" dirty="0"/>
+              <a:t> cos</a:t>
+            </a:r>
+            <a:r>
+              <a:rPr lang="en-US" sz="1400" dirty="0"/>
+              <a:t> </a:t>
+            </a:r>
+            <a:r>
+              <a:rPr lang="en-US" sz="2400" i="1" dirty="0">
+                <a:sym typeface="Symbol" panose="05050102010706020507" pitchFamily="18" charset="2"/>
+              </a:rPr>
+              <a:t></a:t>
+            </a:r>
+            <a:r>
+              <a:rPr lang="en-US" sz="2400" baseline="-25000" dirty="0">
+                <a:sym typeface="Symbol" panose="05050102010706020507" pitchFamily="18" charset="2"/>
+              </a:rPr>
+              <a:t>1</a:t>
+            </a:r>
+            <a:endParaRPr lang="en-US" sz="2400" baseline="-25000" dirty="0"/>
+          </a:p>
+        </p:txBody>
+      </p:sp>
+      <p:grpSp>
+        <p:nvGrpSpPr>
+          <p:cNvPr id="4" name="Group 3">
+            <a:extLst>
+              <a:ext uri="{FF2B5EF4-FFF2-40B4-BE49-F238E27FC236}">
+                <a16:creationId xmlns:a16="http://schemas.microsoft.com/office/drawing/2014/main" id="{BF303828-0BA0-00E1-6053-E94B69745E7D}"/>
+              </a:ext>
+            </a:extLst>
+          </p:cNvPr>
+          <p:cNvGrpSpPr/>
+          <p:nvPr/>
+        </p:nvGrpSpPr>
+        <p:grpSpPr>
+          <a:xfrm>
+            <a:off x="7562446" y="3599847"/>
+            <a:ext cx="1021960" cy="1772242"/>
+            <a:chOff x="8518357" y="1981610"/>
+            <a:chExt cx="1021960" cy="1772242"/>
+          </a:xfrm>
+        </p:grpSpPr>
+        <p:sp>
+          <p:nvSpPr>
+            <p:cNvPr id="6" name="Oval 5">
+              <a:extLst>
+                <a:ext uri="{FF2B5EF4-FFF2-40B4-BE49-F238E27FC236}">
+                  <a16:creationId xmlns:a16="http://schemas.microsoft.com/office/drawing/2014/main" id="{6D5424F5-91BE-B9D6-A816-88B9BA192BB9}"/>
+                </a:ext>
+              </a:extLst>
+            </p:cNvPr>
+            <p:cNvSpPr/>
+            <p:nvPr/>
+          </p:nvSpPr>
+          <p:spPr>
+            <a:xfrm>
+              <a:off x="8518357" y="3359217"/>
+              <a:ext cx="394635" cy="394635"/>
+            </a:xfrm>
+            <a:prstGeom prst="ellipse">
+              <a:avLst/>
+            </a:prstGeom>
+          </p:spPr>
+          <p:style>
+            <a:lnRef idx="2">
+              <a:schemeClr val="accent1">
+                <a:shade val="50000"/>
+              </a:schemeClr>
+            </a:lnRef>
+            <a:fillRef idx="1">
+              <a:schemeClr val="accent1"/>
+            </a:fillRef>
+            <a:effectRef idx="0">
+              <a:schemeClr val="accent1"/>
+            </a:effectRef>
+            <a:fontRef idx="minor">
+              <a:schemeClr val="lt1"/>
+            </a:fontRef>
+          </p:style>
+          <p:txBody>
+            <a:bodyPr rtlCol="0" anchor="ctr"/>
+            <a:lstStyle/>
+            <a:p>
+              <a:pPr algn="ctr"/>
+              <a:endParaRPr lang="en-US"/>
+            </a:p>
+          </p:txBody>
+        </p:sp>
+        <p:cxnSp>
+          <p:nvCxnSpPr>
+            <p:cNvPr id="9" name="Straight Connector 8">
+              <a:extLst>
+                <a:ext uri="{FF2B5EF4-FFF2-40B4-BE49-F238E27FC236}">
+                  <a16:creationId xmlns:a16="http://schemas.microsoft.com/office/drawing/2014/main" id="{C831D71E-1400-2FDF-4060-3A5ABF2D9ED9}"/>
+                </a:ext>
+              </a:extLst>
+            </p:cNvPr>
+            <p:cNvCxnSpPr>
+              <a:cxnSpLocks/>
+            </p:cNvCxnSpPr>
+            <p:nvPr/>
+          </p:nvCxnSpPr>
+          <p:spPr>
+            <a:xfrm flipH="1">
+              <a:off x="8710863" y="1981610"/>
+              <a:ext cx="829454" cy="1579737"/>
+            </a:xfrm>
+            <a:prstGeom prst="line">
+              <a:avLst/>
+            </a:prstGeom>
+          </p:spPr>
+          <p:style>
+            <a:lnRef idx="1">
+              <a:schemeClr val="accent1"/>
+            </a:lnRef>
+            <a:fillRef idx="0">
+              <a:schemeClr val="accent1"/>
+            </a:fillRef>
+            <a:effectRef idx="0">
+              <a:schemeClr val="accent1"/>
+            </a:effectRef>
+            <a:fontRef idx="minor">
+              <a:schemeClr val="tx1"/>
+            </a:fontRef>
+          </p:style>
+        </p:cxnSp>
+      </p:grpSp>
+      <p:sp>
+        <p:nvSpPr>
+          <p:cNvPr id="22" name="TextBox 21">
+            <a:extLst>
+              <a:ext uri="{FF2B5EF4-FFF2-40B4-BE49-F238E27FC236}">
+                <a16:creationId xmlns:a16="http://schemas.microsoft.com/office/drawing/2014/main" id="{E59AB0A4-5BD2-A8BE-56A9-605966402F0C}"/>
+              </a:ext>
+            </a:extLst>
+          </p:cNvPr>
+          <p:cNvSpPr txBox="1"/>
+          <p:nvPr/>
+        </p:nvSpPr>
+        <p:spPr>
+          <a:xfrm>
+            <a:off x="8170358" y="4220707"/>
+            <a:ext cx="449162" cy="461665"/>
+          </a:xfrm>
+          <a:prstGeom prst="rect">
+            <a:avLst/>
+          </a:prstGeom>
+          <a:noFill/>
+        </p:spPr>
+        <p:txBody>
+          <a:bodyPr wrap="none" rtlCol="0">
+            <a:spAutoFit/>
+          </a:bodyPr>
+          <a:lstStyle/>
+          <a:p>
+            <a:r>
+              <a:rPr lang="en-US" sz="2400" i="1" dirty="0">
+                <a:sym typeface="Symbol" panose="05050102010706020507" pitchFamily="18" charset="2"/>
+              </a:rPr>
+              <a:t></a:t>
+            </a:r>
+            <a:r>
+              <a:rPr lang="en-US" sz="2400" baseline="-25000" dirty="0">
+                <a:sym typeface="Symbol" panose="05050102010706020507" pitchFamily="18" charset="2"/>
+              </a:rPr>
+              <a:t>2</a:t>
+            </a:r>
+            <a:endParaRPr lang="en-US" sz="2400" baseline="-25000" dirty="0"/>
+          </a:p>
+        </p:txBody>
+      </p:sp>
+      <p:cxnSp>
+        <p:nvCxnSpPr>
+          <p:cNvPr id="25" name="Straight Connector 24">
+            <a:extLst>
+              <a:ext uri="{FF2B5EF4-FFF2-40B4-BE49-F238E27FC236}">
+                <a16:creationId xmlns:a16="http://schemas.microsoft.com/office/drawing/2014/main" id="{21D6B151-5EFB-CFB8-00F1-B8E7C52A21DF}"/>
+              </a:ext>
+            </a:extLst>
+          </p:cNvPr>
+          <p:cNvCxnSpPr/>
+          <p:nvPr/>
+        </p:nvCxnSpPr>
+        <p:spPr>
+          <a:xfrm flipH="1">
+            <a:off x="5388128" y="5174771"/>
+            <a:ext cx="3265562" cy="0"/>
+          </a:xfrm>
+          <a:prstGeom prst="line">
+            <a:avLst/>
+          </a:prstGeom>
+          <a:ln w="12700">
+            <a:prstDash val="sysDot"/>
+          </a:ln>
+        </p:spPr>
+        <p:style>
+          <a:lnRef idx="1">
+            <a:schemeClr val="accent1"/>
+          </a:lnRef>
+          <a:fillRef idx="0">
+            <a:schemeClr val="accent1"/>
+          </a:fillRef>
+          <a:effectRef idx="0">
+            <a:schemeClr val="accent1"/>
+          </a:effectRef>
+          <a:fontRef idx="minor">
+            <a:schemeClr val="tx1"/>
+          </a:fontRef>
+        </p:style>
+      </p:cxnSp>
+      <p:sp>
+        <p:nvSpPr>
+          <p:cNvPr id="26" name="TextBox 25">
+            <a:extLst>
+              <a:ext uri="{FF2B5EF4-FFF2-40B4-BE49-F238E27FC236}">
+                <a16:creationId xmlns:a16="http://schemas.microsoft.com/office/drawing/2014/main" id="{0F24F96B-0DB8-A265-EDB6-E471152ED869}"/>
+              </a:ext>
+            </a:extLst>
+          </p:cNvPr>
+          <p:cNvSpPr txBox="1"/>
+          <p:nvPr/>
+        </p:nvSpPr>
+        <p:spPr>
+          <a:xfrm>
+            <a:off x="7908205" y="5237150"/>
+            <a:ext cx="1085554" cy="461665"/>
+          </a:xfrm>
+          <a:prstGeom prst="rect">
+            <a:avLst/>
+          </a:prstGeom>
+          <a:noFill/>
+        </p:spPr>
+        <p:txBody>
+          <a:bodyPr wrap="none" rtlCol="0">
+            <a:spAutoFit/>
+          </a:bodyPr>
+          <a:lstStyle/>
+          <a:p>
+            <a:r>
+              <a:rPr lang="en-US" sz="2400" i="1" dirty="0"/>
+              <a:t>l</a:t>
+            </a:r>
+            <a:r>
+              <a:rPr lang="en-US" sz="2400" baseline="-25000" dirty="0"/>
+              <a:t>2</a:t>
+            </a:r>
+            <a:r>
+              <a:rPr lang="en-US" sz="2400" dirty="0"/>
+              <a:t> sin</a:t>
+            </a:r>
+            <a:r>
+              <a:rPr lang="en-US" sz="1400" dirty="0"/>
+              <a:t> </a:t>
+            </a:r>
+            <a:r>
+              <a:rPr lang="en-US" sz="2400" i="1" dirty="0">
+                <a:sym typeface="Symbol" panose="05050102010706020507" pitchFamily="18" charset="2"/>
+              </a:rPr>
+              <a:t></a:t>
+            </a:r>
+            <a:r>
+              <a:rPr lang="en-US" sz="2400" baseline="-25000" dirty="0">
+                <a:sym typeface="Symbol" panose="05050102010706020507" pitchFamily="18" charset="2"/>
+              </a:rPr>
+              <a:t>2</a:t>
+            </a:r>
+            <a:endParaRPr lang="en-US" sz="2400" baseline="-25000" dirty="0"/>
+          </a:p>
+        </p:txBody>
+      </p:sp>
+      <p:sp>
+        <p:nvSpPr>
+          <p:cNvPr id="27" name="TextBox 26">
+            <a:extLst>
+              <a:ext uri="{FF2B5EF4-FFF2-40B4-BE49-F238E27FC236}">
+                <a16:creationId xmlns:a16="http://schemas.microsoft.com/office/drawing/2014/main" id="{3FCA1A7A-9CE5-04D8-F9DF-7A339103AA4E}"/>
+              </a:ext>
+            </a:extLst>
+          </p:cNvPr>
+          <p:cNvSpPr txBox="1"/>
+          <p:nvPr/>
+        </p:nvSpPr>
+        <p:spPr>
+          <a:xfrm>
+            <a:off x="7713538" y="4122349"/>
+            <a:ext cx="359394" cy="461665"/>
+          </a:xfrm>
+          <a:prstGeom prst="rect">
+            <a:avLst/>
+          </a:prstGeom>
+          <a:noFill/>
+        </p:spPr>
+        <p:txBody>
+          <a:bodyPr wrap="none" rtlCol="0">
+            <a:spAutoFit/>
+          </a:bodyPr>
+          <a:lstStyle/>
+          <a:p>
+            <a:r>
+              <a:rPr lang="en-US" sz="2400" i="1" dirty="0"/>
+              <a:t>l</a:t>
+            </a:r>
+            <a:r>
+              <a:rPr lang="en-US" sz="2400" baseline="-25000" dirty="0"/>
+              <a:t>2</a:t>
+            </a:r>
+            <a:endParaRPr lang="LID4096" sz="2400" baseline="-25000" dirty="0"/>
+          </a:p>
+        </p:txBody>
+      </p:sp>
+      <p:sp>
+        <p:nvSpPr>
+          <p:cNvPr id="28" name="TextBox 27">
+            <a:extLst>
+              <a:ext uri="{FF2B5EF4-FFF2-40B4-BE49-F238E27FC236}">
+                <a16:creationId xmlns:a16="http://schemas.microsoft.com/office/drawing/2014/main" id="{AC0C3065-05D1-9B20-882F-EE1A94D0F643}"/>
+              </a:ext>
+            </a:extLst>
+          </p:cNvPr>
+          <p:cNvSpPr txBox="1"/>
+          <p:nvPr/>
+        </p:nvSpPr>
+        <p:spPr>
+          <a:xfrm>
+            <a:off x="8812978" y="4434012"/>
+            <a:ext cx="1236877" cy="461665"/>
+          </a:xfrm>
+          <a:prstGeom prst="rect">
+            <a:avLst/>
+          </a:prstGeom>
+          <a:noFill/>
+        </p:spPr>
+        <p:txBody>
+          <a:bodyPr wrap="none" rtlCol="0">
+            <a:spAutoFit/>
+          </a:bodyPr>
+          <a:lstStyle/>
+          <a:p>
+            <a:r>
+              <a:rPr lang="en-US" sz="2400" i="1" dirty="0"/>
+              <a:t>-l</a:t>
+            </a:r>
+            <a:r>
+              <a:rPr lang="en-US" sz="2400" baseline="-25000" dirty="0"/>
+              <a:t>2</a:t>
+            </a:r>
+            <a:r>
+              <a:rPr lang="en-US" sz="2400" dirty="0"/>
+              <a:t> cos</a:t>
+            </a:r>
+            <a:r>
+              <a:rPr lang="en-US" sz="1400" dirty="0"/>
+              <a:t> </a:t>
+            </a:r>
+            <a:r>
+              <a:rPr lang="en-US" sz="2400" i="1" dirty="0">
+                <a:sym typeface="Symbol" panose="05050102010706020507" pitchFamily="18" charset="2"/>
+              </a:rPr>
+              <a:t></a:t>
+            </a:r>
+            <a:r>
+              <a:rPr lang="en-US" sz="2400" baseline="-25000" dirty="0">
+                <a:sym typeface="Symbol" panose="05050102010706020507" pitchFamily="18" charset="2"/>
+              </a:rPr>
+              <a:t>2</a:t>
+            </a:r>
+            <a:endParaRPr lang="en-US" sz="2400" baseline="-25000" dirty="0"/>
+          </a:p>
+        </p:txBody>
+      </p:sp>
+      <p:sp>
+        <p:nvSpPr>
+          <p:cNvPr id="29" name="TextBox 28">
+            <a:extLst>
+              <a:ext uri="{FF2B5EF4-FFF2-40B4-BE49-F238E27FC236}">
+                <a16:creationId xmlns:a16="http://schemas.microsoft.com/office/drawing/2014/main" id="{CCCC369D-EB01-C7FB-7480-09A54B41A13E}"/>
+              </a:ext>
+            </a:extLst>
+          </p:cNvPr>
+          <p:cNvSpPr txBox="1"/>
+          <p:nvPr/>
+        </p:nvSpPr>
+        <p:spPr>
+          <a:xfrm>
+            <a:off x="8970501" y="3104494"/>
+            <a:ext cx="532518" cy="461665"/>
+          </a:xfrm>
+          <a:prstGeom prst="rect">
+            <a:avLst/>
+          </a:prstGeom>
+          <a:noFill/>
+        </p:spPr>
+        <p:txBody>
+          <a:bodyPr wrap="none" rtlCol="0">
+            <a:spAutoFit/>
+          </a:bodyPr>
+          <a:lstStyle/>
+          <a:p>
+            <a:r>
+              <a:rPr lang="en-US" sz="2400" i="1" dirty="0"/>
+              <a:t>m</a:t>
+            </a:r>
+            <a:r>
+              <a:rPr lang="en-US" sz="2400" baseline="-25000" dirty="0"/>
+              <a:t>1</a:t>
+            </a:r>
+            <a:endParaRPr lang="LID4096" sz="2400" baseline="-25000" dirty="0"/>
+          </a:p>
+        </p:txBody>
+      </p:sp>
+      <p:sp>
+        <p:nvSpPr>
+          <p:cNvPr id="30" name="TextBox 29">
+            <a:extLst>
+              <a:ext uri="{FF2B5EF4-FFF2-40B4-BE49-F238E27FC236}">
+                <a16:creationId xmlns:a16="http://schemas.microsoft.com/office/drawing/2014/main" id="{4EA27157-54F2-0515-12FB-0D81A1B6F258}"/>
+              </a:ext>
+            </a:extLst>
+          </p:cNvPr>
+          <p:cNvSpPr txBox="1"/>
+          <p:nvPr/>
+        </p:nvSpPr>
+        <p:spPr>
+          <a:xfrm>
+            <a:off x="7025736" y="5055244"/>
+            <a:ext cx="532518" cy="461665"/>
+          </a:xfrm>
+          <a:prstGeom prst="rect">
+            <a:avLst/>
+          </a:prstGeom>
+          <a:noFill/>
+        </p:spPr>
+        <p:txBody>
+          <a:bodyPr wrap="none" rtlCol="0">
+            <a:spAutoFit/>
+          </a:bodyPr>
+          <a:lstStyle/>
+          <a:p>
+            <a:r>
+              <a:rPr lang="en-US" sz="2400" i="1" dirty="0"/>
+              <a:t>m</a:t>
+            </a:r>
+            <a:r>
+              <a:rPr lang="en-US" sz="2400" baseline="-25000" dirty="0"/>
+              <a:t>2</a:t>
+            </a:r>
+            <a:endParaRPr lang="LID4096" sz="2400" baseline="-25000" dirty="0"/>
+          </a:p>
+        </p:txBody>
+      </p:sp>
+      <p:sp>
+        <p:nvSpPr>
+          <p:cNvPr id="31" name="Arc 30">
+            <a:extLst>
+              <a:ext uri="{FF2B5EF4-FFF2-40B4-BE49-F238E27FC236}">
+                <a16:creationId xmlns:a16="http://schemas.microsoft.com/office/drawing/2014/main" id="{9BE57C37-B31E-DF4E-6654-425158CB5283}"/>
+              </a:ext>
+            </a:extLst>
+          </p:cNvPr>
+          <p:cNvSpPr/>
+          <p:nvPr/>
+        </p:nvSpPr>
+        <p:spPr>
+          <a:xfrm flipH="1" flipV="1">
+            <a:off x="8315979" y="3883003"/>
+            <a:ext cx="654522" cy="341105"/>
+          </a:xfrm>
+          <a:prstGeom prst="arc">
+            <a:avLst/>
+          </a:prstGeom>
+          <a:ln w="22225">
+            <a:prstDash val="sysDot"/>
+          </a:ln>
+        </p:spPr>
+        <p:style>
+          <a:lnRef idx="1">
+            <a:schemeClr val="accent1"/>
+          </a:lnRef>
+          <a:fillRef idx="0">
+            <a:schemeClr val="accent1"/>
+          </a:fillRef>
+          <a:effectRef idx="0">
+            <a:schemeClr val="accent1"/>
+          </a:effectRef>
+          <a:fontRef idx="minor">
+            <a:schemeClr val="tx1"/>
+          </a:fontRef>
+        </p:style>
+        <p:txBody>
+          <a:bodyPr rtlCol="0" anchor="ctr"/>
+          <a:lstStyle/>
+          <a:p>
+            <a:pPr algn="ctr"/>
+            <a:endParaRPr lang="en-US"/>
+          </a:p>
+        </p:txBody>
+      </p:sp>
+    </p:spTree>
+    <p:extLst>
+      <p:ext uri="{BB962C8B-B14F-4D97-AF65-F5344CB8AC3E}">
+        <p14:creationId xmlns:p14="http://schemas.microsoft.com/office/powerpoint/2010/main" val="3571560792"/>
       </p:ext>
     </p:extLst>
   </p:cSld>

</xml_diff>